<commit_message>
add game for two players
</commit_message>
<xml_diff>
--- a/doc/Math Duels.pptx
+++ b/doc/Math Duels.pptx
@@ -112,6 +112,11 @@
       </a:defRPr>
     </a:lvl9pPr>
   </p:defaultTextStyle>
+  <p:extLst>
+    <p:ext uri="{EFAFB233-063F-42B5-8137-9DF3F51BA10A}">
+      <p15:sldGuideLst xmlns:p15="http://schemas.microsoft.com/office/powerpoint/2012/main"/>
+    </p:ext>
+  </p:extLst>
 </p:presentation>
 </file>
 
@@ -262,7 +267,7 @@
           <a:p>
             <a:fld id="{82EDB8D0-98ED-4B86-9D5F-E61ADC70144D}" type="datetimeFigureOut">
               <a:rPr lang="en-US" smtClean="0"/>
-              <a:t>1/10/2023</a:t>
+              <a:t>1/16/2023</a:t>
             </a:fld>
             <a:endParaRPr lang="en-US" dirty="0"/>
           </a:p>
@@ -677,7 +682,7 @@
           <a:p>
             <a:fld id="{82EDB8D0-98ED-4B86-9D5F-E61ADC70144D}" type="datetimeFigureOut">
               <a:rPr lang="en-US" smtClean="0"/>
-              <a:t>1/10/2023</a:t>
+              <a:t>1/16/2023</a:t>
             </a:fld>
             <a:endParaRPr lang="en-US"/>
           </a:p>
@@ -1169,7 +1174,7 @@
           <a:p>
             <a:fld id="{82EDB8D0-98ED-4B86-9D5F-E61ADC70144D}" type="datetimeFigureOut">
               <a:rPr lang="en-US" smtClean="0"/>
-              <a:t>1/10/2023</a:t>
+              <a:t>1/16/2023</a:t>
             </a:fld>
             <a:endParaRPr lang="en-US"/>
           </a:p>
@@ -1656,7 +1661,7 @@
           <a:p>
             <a:fld id="{82EDB8D0-98ED-4B86-9D5F-E61ADC70144D}" type="datetimeFigureOut">
               <a:rPr lang="en-US" smtClean="0"/>
-              <a:t>1/10/2023</a:t>
+              <a:t>1/16/2023</a:t>
             </a:fld>
             <a:endParaRPr lang="en-US" dirty="0"/>
           </a:p>
@@ -2425,7 +2430,7 @@
           <a:p>
             <a:fld id="{82EDB8D0-98ED-4B86-9D5F-E61ADC70144D}" type="datetimeFigureOut">
               <a:rPr lang="en-US" smtClean="0"/>
-              <a:t>1/10/2023</a:t>
+              <a:t>1/16/2023</a:t>
             </a:fld>
             <a:endParaRPr lang="en-US"/>
           </a:p>
@@ -2907,7 +2912,7 @@
           <a:p>
             <a:fld id="{82EDB8D0-98ED-4B86-9D5F-E61ADC70144D}" type="datetimeFigureOut">
               <a:rPr lang="en-US" smtClean="0"/>
-              <a:t>1/10/2023</a:t>
+              <a:t>1/16/2023</a:t>
             </a:fld>
             <a:endParaRPr lang="en-US"/>
           </a:p>
@@ -3603,7 +3608,7 @@
           <a:p>
             <a:fld id="{82EDB8D0-98ED-4B86-9D5F-E61ADC70144D}" type="datetimeFigureOut">
               <a:rPr lang="en-US" smtClean="0"/>
-              <a:t>1/10/2023</a:t>
+              <a:t>1/16/2023</a:t>
             </a:fld>
             <a:endParaRPr lang="en-US"/>
           </a:p>
@@ -4028,7 +4033,7 @@
           <a:p>
             <a:fld id="{82EDB8D0-98ED-4B86-9D5F-E61ADC70144D}" type="datetimeFigureOut">
               <a:rPr lang="en-US" smtClean="0"/>
-              <a:t>1/10/2023</a:t>
+              <a:t>1/16/2023</a:t>
             </a:fld>
             <a:endParaRPr lang="en-US"/>
           </a:p>
@@ -4425,7 +4430,7 @@
           <a:p>
             <a:fld id="{82EDB8D0-98ED-4B86-9D5F-E61ADC70144D}" type="datetimeFigureOut">
               <a:rPr lang="en-US" smtClean="0"/>
-              <a:t>1/10/2023</a:t>
+              <a:t>1/16/2023</a:t>
             </a:fld>
             <a:endParaRPr lang="en-US"/>
           </a:p>
@@ -5020,7 +5025,7 @@
           <a:p>
             <a:fld id="{82EDB8D0-98ED-4B86-9D5F-E61ADC70144D}" type="datetimeFigureOut">
               <a:rPr lang="en-US" smtClean="0"/>
-              <a:t>1/10/2023</a:t>
+              <a:t>1/16/2023</a:t>
             </a:fld>
             <a:endParaRPr lang="en-US"/>
           </a:p>
@@ -5595,7 +5600,7 @@
           <a:p>
             <a:fld id="{82EDB8D0-98ED-4B86-9D5F-E61ADC70144D}" type="datetimeFigureOut">
               <a:rPr lang="en-US" smtClean="0"/>
-              <a:t>1/10/2023</a:t>
+              <a:t>1/16/2023</a:t>
             </a:fld>
             <a:endParaRPr lang="en-US"/>
           </a:p>
@@ -6122,7 +6127,7 @@
             <a:fld id="{82EDB8D0-98ED-4B86-9D5F-E61ADC70144D}" type="datetimeFigureOut">
               <a:rPr lang="en-US" smtClean="0"/>
               <a:pPr/>
-              <a:t>1/10/2023</a:t>
+              <a:t>1/16/2023</a:t>
             </a:fld>
             <a:endParaRPr lang="en-US" dirty="0"/>
           </a:p>
@@ -7045,13 +7050,13 @@
   <p:clrMapOvr>
     <a:masterClrMapping/>
   </p:clrMapOvr>
-  <mc:AlternateContent xmlns:mc="http://schemas.openxmlformats.org/markup-compatibility/2006">
-    <mc:Choice xmlns:p14="http://schemas.microsoft.com/office/powerpoint/2010/main" Requires="p14">
+  <mc:AlternateContent xmlns:mc="http://schemas.openxmlformats.org/markup-compatibility/2006" xmlns:p14="http://schemas.microsoft.com/office/powerpoint/2010/main">
+    <mc:Choice Requires="p14">
       <p:transition spd="slow" p14:dur="3400">
         <p14:reveal/>
       </p:transition>
     </mc:Choice>
-    <mc:Fallback>
+    <mc:Fallback xmlns="">
       <p:transition spd="slow">
         <p:fade/>
       </p:transition>
@@ -7278,13 +7283,13 @@
   <p:clrMapOvr>
     <a:masterClrMapping/>
   </p:clrMapOvr>
-  <mc:AlternateContent xmlns:mc="http://schemas.openxmlformats.org/markup-compatibility/2006">
-    <mc:Choice xmlns:p14="http://schemas.microsoft.com/office/powerpoint/2010/main" Requires="p14">
+  <mc:AlternateContent xmlns:mc="http://schemas.openxmlformats.org/markup-compatibility/2006" xmlns:p14="http://schemas.microsoft.com/office/powerpoint/2010/main">
+    <mc:Choice Requires="p14">
       <p:transition spd="slow" p14:dur="3400">
         <p14:reveal/>
       </p:transition>
     </mc:Choice>
-    <mc:Fallback>
+    <mc:Fallback xmlns="">
       <p:transition spd="slow">
         <p:fade/>
       </p:transition>
@@ -7311,7 +7316,7 @@
                             </p:stCondLst>
                             <p:childTnLst>
                               <p:par>
-                                <p:cTn id="5" presetID="10" presetClass="entr" presetSubtype="0" fill="hold" grpId="0" nodeType="clickEffect">
+                                <p:cTn id="5" presetID="10" presetClass="entr" presetSubtype="0" fill="hold" nodeType="clickEffect">
                                   <p:stCondLst>
                                     <p:cond delay="0"/>
                                   </p:stCondLst>
@@ -7324,7 +7329,11 @@
                                           </p:stCondLst>
                                         </p:cTn>
                                         <p:tgtEl>
-                                          <p:spTgt spid="2"/>
+                                          <p:spTgt spid="3">
+                                            <p:txEl>
+                                              <p:pRg st="0" end="0"/>
+                                            </p:txEl>
+                                          </p:spTgt>
                                         </p:tgtEl>
                                         <p:attrNameLst>
                                           <p:attrName>style.visibility</p:attrName>
@@ -7338,7 +7347,11 @@
                                       <p:cBhvr>
                                         <p:cTn id="7" dur="500"/>
                                         <p:tgtEl>
-                                          <p:spTgt spid="2"/>
+                                          <p:spTgt spid="3">
+                                            <p:txEl>
+                                              <p:pRg st="0" end="0"/>
+                                            </p:txEl>
+                                          </p:spTgt>
                                         </p:tgtEl>
                                       </p:cBhvr>
                                     </p:animEffect>
@@ -7379,7 +7392,7 @@
                                         <p:tgtEl>
                                           <p:spTgt spid="3">
                                             <p:txEl>
-                                              <p:pRg st="0" end="0"/>
+                                              <p:pRg st="1" end="1"/>
                                             </p:txEl>
                                           </p:spTgt>
                                         </p:tgtEl>
@@ -7397,901 +7410,7 @@
                                         <p:tgtEl>
                                           <p:spTgt spid="3">
                                             <p:txEl>
-                                              <p:pRg st="0" end="0"/>
-                                            </p:txEl>
-                                          </p:spTgt>
-                                        </p:tgtEl>
-                                      </p:cBhvr>
-                                    </p:animEffect>
-                                  </p:childTnLst>
-                                </p:cTn>
-                              </p:par>
-                            </p:childTnLst>
-                          </p:cTn>
-                        </p:par>
-                      </p:childTnLst>
-                    </p:cTn>
-                  </p:par>
-                  <p:par>
-                    <p:cTn id="13" fill="hold">
-                      <p:stCondLst>
-                        <p:cond delay="indefinite"/>
-                      </p:stCondLst>
-                      <p:childTnLst>
-                        <p:par>
-                          <p:cTn id="14" fill="hold">
-                            <p:stCondLst>
-                              <p:cond delay="0"/>
-                            </p:stCondLst>
-                            <p:childTnLst>
-                              <p:par>
-                                <p:cTn id="15" presetID="10" presetClass="entr" presetSubtype="0" fill="hold" nodeType="clickEffect">
-                                  <p:stCondLst>
-                                    <p:cond delay="0"/>
-                                  </p:stCondLst>
-                                  <p:childTnLst>
-                                    <p:set>
-                                      <p:cBhvr>
-                                        <p:cTn id="16" dur="1" fill="hold">
-                                          <p:stCondLst>
-                                            <p:cond delay="0"/>
-                                          </p:stCondLst>
-                                        </p:cTn>
-                                        <p:tgtEl>
-                                          <p:spTgt spid="3">
-                                            <p:txEl>
                                               <p:pRg st="1" end="1"/>
-                                            </p:txEl>
-                                          </p:spTgt>
-                                        </p:tgtEl>
-                                        <p:attrNameLst>
-                                          <p:attrName>style.visibility</p:attrName>
-                                        </p:attrNameLst>
-                                      </p:cBhvr>
-                                      <p:to>
-                                        <p:strVal val="visible"/>
-                                      </p:to>
-                                    </p:set>
-                                    <p:animEffect transition="in" filter="fade">
-                                      <p:cBhvr>
-                                        <p:cTn id="17" dur="500"/>
-                                        <p:tgtEl>
-                                          <p:spTgt spid="3">
-                                            <p:txEl>
-                                              <p:pRg st="1" end="1"/>
-                                            </p:txEl>
-                                          </p:spTgt>
-                                        </p:tgtEl>
-                                      </p:cBhvr>
-                                    </p:animEffect>
-                                  </p:childTnLst>
-                                </p:cTn>
-                              </p:par>
-                            </p:childTnLst>
-                          </p:cTn>
-                        </p:par>
-                      </p:childTnLst>
-                    </p:cTn>
-                  </p:par>
-                  <p:par>
-                    <p:cTn id="18" fill="hold">
-                      <p:stCondLst>
-                        <p:cond delay="indefinite"/>
-                      </p:stCondLst>
-                      <p:childTnLst>
-                        <p:par>
-                          <p:cTn id="19" fill="hold">
-                            <p:stCondLst>
-                              <p:cond delay="0"/>
-                            </p:stCondLst>
-                            <p:childTnLst>
-                              <p:par>
-                                <p:cTn id="20" presetID="10" presetClass="entr" presetSubtype="0" fill="hold" nodeType="clickEffect">
-                                  <p:stCondLst>
-                                    <p:cond delay="0"/>
-                                  </p:stCondLst>
-                                  <p:childTnLst>
-                                    <p:set>
-                                      <p:cBhvr>
-                                        <p:cTn id="21" dur="1" fill="hold">
-                                          <p:stCondLst>
-                                            <p:cond delay="0"/>
-                                          </p:stCondLst>
-                                        </p:cTn>
-                                        <p:tgtEl>
-                                          <p:spTgt spid="3">
-                                            <p:txEl>
-                                              <p:pRg st="2" end="2"/>
-                                            </p:txEl>
-                                          </p:spTgt>
-                                        </p:tgtEl>
-                                        <p:attrNameLst>
-                                          <p:attrName>style.visibility</p:attrName>
-                                        </p:attrNameLst>
-                                      </p:cBhvr>
-                                      <p:to>
-                                        <p:strVal val="visible"/>
-                                      </p:to>
-                                    </p:set>
-                                    <p:animEffect transition="in" filter="fade">
-                                      <p:cBhvr>
-                                        <p:cTn id="22" dur="500"/>
-                                        <p:tgtEl>
-                                          <p:spTgt spid="3">
-                                            <p:txEl>
-                                              <p:pRg st="2" end="2"/>
-                                            </p:txEl>
-                                          </p:spTgt>
-                                        </p:tgtEl>
-                                      </p:cBhvr>
-                                    </p:animEffect>
-                                  </p:childTnLst>
-                                </p:cTn>
-                              </p:par>
-                            </p:childTnLst>
-                          </p:cTn>
-                        </p:par>
-                      </p:childTnLst>
-                    </p:cTn>
-                  </p:par>
-                </p:childTnLst>
-              </p:cTn>
-              <p:prevCondLst>
-                <p:cond evt="onPrev" delay="0">
-                  <p:tgtEl>
-                    <p:sldTgt/>
-                  </p:tgtEl>
-                </p:cond>
-              </p:prevCondLst>
-              <p:nextCondLst>
-                <p:cond evt="onNext" delay="0">
-                  <p:tgtEl>
-                    <p:sldTgt/>
-                  </p:tgtEl>
-                </p:cond>
-              </p:nextCondLst>
-            </p:seq>
-          </p:childTnLst>
-        </p:cTn>
-      </p:par>
-    </p:tnLst>
-    <p:bldLst>
-      <p:bldP spid="2" grpId="0"/>
-    </p:bldLst>
-  </p:timing>
-</p:sld>
-</file>
-
-<file path=ppt/slides/slide3.xml><?xml version="1.0" encoding="utf-8"?>
-<p:sld xmlns:a="http://schemas.openxmlformats.org/drawingml/2006/main" xmlns:r="http://schemas.openxmlformats.org/officeDocument/2006/relationships" xmlns:p="http://schemas.openxmlformats.org/presentationml/2006/main">
-  <p:cSld>
-    <p:bg>
-      <p:bgPr>
-        <a:solidFill>
-          <a:schemeClr val="bg1">
-            <a:alpha val="78000"/>
-          </a:schemeClr>
-        </a:solidFill>
-        <a:effectLst/>
-      </p:bgPr>
-    </p:bg>
-    <p:spTree>
-      <p:nvGrpSpPr>
-        <p:cNvPr id="1" name=""/>
-        <p:cNvGrpSpPr/>
-        <p:nvPr/>
-      </p:nvGrpSpPr>
-      <p:grpSpPr>
-        <a:xfrm>
-          <a:off x="0" y="0"/>
-          <a:ext cx="0" cy="0"/>
-          <a:chOff x="0" y="0"/>
-          <a:chExt cx="0" cy="0"/>
-        </a:xfrm>
-      </p:grpSpPr>
-      <p:sp>
-        <p:nvSpPr>
-          <p:cNvPr id="2" name="Заголовок 1">
-            <a:extLst>
-              <a:ext uri="{FF2B5EF4-FFF2-40B4-BE49-F238E27FC236}">
-                <a16:creationId xmlns:a16="http://schemas.microsoft.com/office/drawing/2014/main" id="{1F7CFFEC-556E-45D9-9D24-7EF78DD86FD9}"/>
-              </a:ext>
-            </a:extLst>
-          </p:cNvPr>
-          <p:cNvSpPr>
-            <a:spLocks noGrp="1"/>
-          </p:cNvSpPr>
-          <p:nvPr>
-            <p:ph type="title"/>
-          </p:nvPr>
-        </p:nvSpPr>
-        <p:spPr>
-          <a:xfrm>
-            <a:off x="838201" y="207373"/>
-            <a:ext cx="10515600" cy="1325563"/>
-          </a:xfrm>
-        </p:spPr>
-        <p:txBody>
-          <a:bodyPr/>
-          <a:lstStyle/>
-          <a:p>
-            <a:r>
-              <a:rPr lang="ru-RU" dirty="0">
-                <a:solidFill>
-                  <a:schemeClr val="tx1">
-                    <a:lumMod val="85000"/>
-                    <a:lumOff val="15000"/>
-                  </a:schemeClr>
-                </a:solidFill>
-              </a:rPr>
-              <a:t>Реализация:</a:t>
-            </a:r>
-          </a:p>
-        </p:txBody>
-      </p:sp>
-      <p:sp>
-        <p:nvSpPr>
-          <p:cNvPr id="3" name="Объект 2">
-            <a:extLst>
-              <a:ext uri="{FF2B5EF4-FFF2-40B4-BE49-F238E27FC236}">
-                <a16:creationId xmlns:a16="http://schemas.microsoft.com/office/drawing/2014/main" id="{D5964C29-1AF1-424C-90B7-BBAFA6440403}"/>
-              </a:ext>
-            </a:extLst>
-          </p:cNvPr>
-          <p:cNvSpPr>
-            <a:spLocks noGrp="1"/>
-          </p:cNvSpPr>
-          <p:nvPr>
-            <p:ph idx="1"/>
-          </p:nvPr>
-        </p:nvSpPr>
-        <p:spPr>
-          <a:xfrm>
-            <a:off x="838199" y="1532936"/>
-            <a:ext cx="10695040" cy="5037701"/>
-          </a:xfrm>
-        </p:spPr>
-        <p:txBody>
-          <a:bodyPr>
-            <a:normAutofit/>
-          </a:bodyPr>
-          <a:lstStyle/>
-          <a:p>
-            <a:pPr marL="0" indent="0">
-              <a:buNone/>
-            </a:pPr>
-            <a:r>
-              <a:rPr lang="ru-RU" dirty="0">
-                <a:effectLst/>
-                <a:ea typeface="Calibri" panose="020F0502020204030204" pitchFamily="34" charset="0"/>
-              </a:rPr>
-              <a:t>Игра написана на языке программирования </a:t>
-            </a:r>
-            <a:r>
-              <a:rPr lang="en-US" dirty="0">
-                <a:effectLst/>
-                <a:ea typeface="Calibri" panose="020F0502020204030204" pitchFamily="34" charset="0"/>
-              </a:rPr>
-              <a:t>Python </a:t>
-            </a:r>
-            <a:r>
-              <a:rPr lang="ru-RU" dirty="0">
-                <a:effectLst/>
-                <a:ea typeface="Calibri" panose="020F0502020204030204" pitchFamily="34" charset="0"/>
-              </a:rPr>
-              <a:t>с использованием </a:t>
-            </a:r>
-            <a:r>
-              <a:rPr lang="en-US" dirty="0" err="1">
-                <a:effectLst/>
-                <a:ea typeface="Calibri" panose="020F0502020204030204" pitchFamily="34" charset="0"/>
-              </a:rPr>
-              <a:t>pygame</a:t>
-            </a:r>
-            <a:r>
-              <a:rPr lang="en-US" dirty="0">
-                <a:effectLst/>
-                <a:ea typeface="Calibri" panose="020F0502020204030204" pitchFamily="34" charset="0"/>
-              </a:rPr>
-              <a:t> </a:t>
-            </a:r>
-            <a:r>
-              <a:rPr lang="ru-RU" dirty="0">
-                <a:effectLst/>
-                <a:ea typeface="Calibri" panose="020F0502020204030204" pitchFamily="34" charset="0"/>
-              </a:rPr>
-              <a:t>и </a:t>
-            </a:r>
-            <a:r>
-              <a:rPr lang="en-US" dirty="0"/>
-              <a:t>sqlite3.</a:t>
-            </a:r>
-            <a:endParaRPr lang="ru-RU" dirty="0"/>
-          </a:p>
-          <a:p>
-            <a:pPr marL="0" indent="0">
-              <a:buNone/>
-            </a:pPr>
-            <a:r>
-              <a:rPr lang="ru-RU" dirty="0"/>
-              <a:t>За запуск игры отвечает класс ???</a:t>
-            </a:r>
-          </a:p>
-          <a:p>
-            <a:pPr marL="0" indent="0">
-              <a:buNone/>
-            </a:pPr>
-            <a:r>
-              <a:rPr lang="ru-RU" dirty="0"/>
-              <a:t>Начальное окно позволяет начать одиночную игру, игру на двух человек, перейти в магазин и настройки, а также пройти обучение.</a:t>
-            </a:r>
-          </a:p>
-        </p:txBody>
-      </p:sp>
-    </p:spTree>
-    <p:extLst>
-      <p:ext uri="{BB962C8B-B14F-4D97-AF65-F5344CB8AC3E}">
-        <p14:creationId xmlns:p14="http://schemas.microsoft.com/office/powerpoint/2010/main" val="3629080883"/>
-      </p:ext>
-    </p:extLst>
-  </p:cSld>
-  <p:clrMapOvr>
-    <a:masterClrMapping/>
-  </p:clrMapOvr>
-  <mc:AlternateContent xmlns:mc="http://schemas.openxmlformats.org/markup-compatibility/2006">
-    <mc:Choice xmlns:p14="http://schemas.microsoft.com/office/powerpoint/2010/main" Requires="p14">
-      <p:transition spd="slow" p14:dur="3400">
-        <p14:reveal/>
-      </p:transition>
-    </mc:Choice>
-    <mc:Fallback>
-      <p:transition spd="slow">
-        <p:fade/>
-      </p:transition>
-    </mc:Fallback>
-  </mc:AlternateContent>
-  <p:timing>
-    <p:tnLst>
-      <p:par>
-        <p:cTn id="1" dur="indefinite" restart="never" nodeType="tmRoot">
-          <p:childTnLst>
-            <p:seq concurrent="1" nextAc="seek">
-              <p:cTn id="2" dur="indefinite" nodeType="mainSeq">
-                <p:childTnLst>
-                  <p:par>
-                    <p:cTn id="3" fill="hold">
-                      <p:stCondLst>
-                        <p:cond delay="indefinite"/>
-                      </p:stCondLst>
-                      <p:childTnLst>
-                        <p:par>
-                          <p:cTn id="4" fill="hold">
-                            <p:stCondLst>
-                              <p:cond delay="0"/>
-                            </p:stCondLst>
-                            <p:childTnLst>
-                              <p:par>
-                                <p:cTn id="5" presetID="10" presetClass="entr" presetSubtype="0" fill="hold" grpId="0" nodeType="clickEffect">
-                                  <p:stCondLst>
-                                    <p:cond delay="0"/>
-                                  </p:stCondLst>
-                                  <p:childTnLst>
-                                    <p:set>
-                                      <p:cBhvr>
-                                        <p:cTn id="6" dur="1" fill="hold">
-                                          <p:stCondLst>
-                                            <p:cond delay="0"/>
-                                          </p:stCondLst>
-                                        </p:cTn>
-                                        <p:tgtEl>
-                                          <p:spTgt spid="2"/>
-                                        </p:tgtEl>
-                                        <p:attrNameLst>
-                                          <p:attrName>style.visibility</p:attrName>
-                                        </p:attrNameLst>
-                                      </p:cBhvr>
-                                      <p:to>
-                                        <p:strVal val="visible"/>
-                                      </p:to>
-                                    </p:set>
-                                    <p:animEffect transition="in" filter="fade">
-                                      <p:cBhvr>
-                                        <p:cTn id="7" dur="500"/>
-                                        <p:tgtEl>
-                                          <p:spTgt spid="2"/>
-                                        </p:tgtEl>
-                                      </p:cBhvr>
-                                    </p:animEffect>
-                                  </p:childTnLst>
-                                </p:cTn>
-                              </p:par>
-                            </p:childTnLst>
-                          </p:cTn>
-                        </p:par>
-                      </p:childTnLst>
-                    </p:cTn>
-                  </p:par>
-                  <p:par>
-                    <p:cTn id="8" fill="hold">
-                      <p:stCondLst>
-                        <p:cond delay="indefinite"/>
-                      </p:stCondLst>
-                      <p:childTnLst>
-                        <p:par>
-                          <p:cTn id="9" fill="hold">
-                            <p:stCondLst>
-                              <p:cond delay="0"/>
-                            </p:stCondLst>
-                            <p:childTnLst>
-                              <p:par>
-                                <p:cTn id="10" presetID="10" presetClass="entr" presetSubtype="0" fill="hold" nodeType="clickEffect">
-                                  <p:stCondLst>
-                                    <p:cond delay="0"/>
-                                  </p:stCondLst>
-                                  <p:childTnLst>
-                                    <p:set>
-                                      <p:cBhvr>
-                                        <p:cTn id="11" dur="1" fill="hold">
-                                          <p:stCondLst>
-                                            <p:cond delay="0"/>
-                                          </p:stCondLst>
-                                        </p:cTn>
-                                        <p:tgtEl>
-                                          <p:spTgt spid="3">
-                                            <p:txEl>
-                                              <p:pRg st="0" end="0"/>
-                                            </p:txEl>
-                                          </p:spTgt>
-                                        </p:tgtEl>
-                                        <p:attrNameLst>
-                                          <p:attrName>style.visibility</p:attrName>
-                                        </p:attrNameLst>
-                                      </p:cBhvr>
-                                      <p:to>
-                                        <p:strVal val="visible"/>
-                                      </p:to>
-                                    </p:set>
-                                    <p:animEffect transition="in" filter="fade">
-                                      <p:cBhvr>
-                                        <p:cTn id="12" dur="500"/>
-                                        <p:tgtEl>
-                                          <p:spTgt spid="3">
-                                            <p:txEl>
-                                              <p:pRg st="0" end="0"/>
-                                            </p:txEl>
-                                          </p:spTgt>
-                                        </p:tgtEl>
-                                      </p:cBhvr>
-                                    </p:animEffect>
-                                  </p:childTnLst>
-                                </p:cTn>
-                              </p:par>
-                              <p:par>
-                                <p:cTn id="13" presetID="10" presetClass="entr" presetSubtype="0" fill="hold" nodeType="withEffect">
-                                  <p:stCondLst>
-                                    <p:cond delay="0"/>
-                                  </p:stCondLst>
-                                  <p:childTnLst>
-                                    <p:set>
-                                      <p:cBhvr>
-                                        <p:cTn id="14" dur="1" fill="hold">
-                                          <p:stCondLst>
-                                            <p:cond delay="0"/>
-                                          </p:stCondLst>
-                                        </p:cTn>
-                                        <p:tgtEl>
-                                          <p:spTgt spid="3">
-                                            <p:txEl>
-                                              <p:pRg st="1" end="1"/>
-                                            </p:txEl>
-                                          </p:spTgt>
-                                        </p:tgtEl>
-                                        <p:attrNameLst>
-                                          <p:attrName>style.visibility</p:attrName>
-                                        </p:attrNameLst>
-                                      </p:cBhvr>
-                                      <p:to>
-                                        <p:strVal val="visible"/>
-                                      </p:to>
-                                    </p:set>
-                                    <p:animEffect transition="in" filter="fade">
-                                      <p:cBhvr>
-                                        <p:cTn id="15" dur="500"/>
-                                        <p:tgtEl>
-                                          <p:spTgt spid="3">
-                                            <p:txEl>
-                                              <p:pRg st="1" end="1"/>
-                                            </p:txEl>
-                                          </p:spTgt>
-                                        </p:tgtEl>
-                                      </p:cBhvr>
-                                    </p:animEffect>
-                                  </p:childTnLst>
-                                </p:cTn>
-                              </p:par>
-                            </p:childTnLst>
-                          </p:cTn>
-                        </p:par>
-                      </p:childTnLst>
-                    </p:cTn>
-                  </p:par>
-                  <p:par>
-                    <p:cTn id="16" fill="hold">
-                      <p:stCondLst>
-                        <p:cond delay="indefinite"/>
-                      </p:stCondLst>
-                      <p:childTnLst>
-                        <p:par>
-                          <p:cTn id="17" fill="hold">
-                            <p:stCondLst>
-                              <p:cond delay="0"/>
-                            </p:stCondLst>
-                            <p:childTnLst>
-                              <p:par>
-                                <p:cTn id="18" presetID="10" presetClass="entr" presetSubtype="0" fill="hold" nodeType="clickEffect">
-                                  <p:stCondLst>
-                                    <p:cond delay="0"/>
-                                  </p:stCondLst>
-                                  <p:childTnLst>
-                                    <p:set>
-                                      <p:cBhvr>
-                                        <p:cTn id="19" dur="1" fill="hold">
-                                          <p:stCondLst>
-                                            <p:cond delay="0"/>
-                                          </p:stCondLst>
-                                        </p:cTn>
-                                        <p:tgtEl>
-                                          <p:spTgt spid="3">
-                                            <p:txEl>
-                                              <p:pRg st="2" end="2"/>
-                                            </p:txEl>
-                                          </p:spTgt>
-                                        </p:tgtEl>
-                                        <p:attrNameLst>
-                                          <p:attrName>style.visibility</p:attrName>
-                                        </p:attrNameLst>
-                                      </p:cBhvr>
-                                      <p:to>
-                                        <p:strVal val="visible"/>
-                                      </p:to>
-                                    </p:set>
-                                    <p:animEffect transition="in" filter="fade">
-                                      <p:cBhvr>
-                                        <p:cTn id="20" dur="500"/>
-                                        <p:tgtEl>
-                                          <p:spTgt spid="3">
-                                            <p:txEl>
-                                              <p:pRg st="2" end="2"/>
-                                            </p:txEl>
-                                          </p:spTgt>
-                                        </p:tgtEl>
-                                      </p:cBhvr>
-                                    </p:animEffect>
-                                  </p:childTnLst>
-                                </p:cTn>
-                              </p:par>
-                            </p:childTnLst>
-                          </p:cTn>
-                        </p:par>
-                      </p:childTnLst>
-                    </p:cTn>
-                  </p:par>
-                </p:childTnLst>
-              </p:cTn>
-              <p:prevCondLst>
-                <p:cond evt="onPrev" delay="0">
-                  <p:tgtEl>
-                    <p:sldTgt/>
-                  </p:tgtEl>
-                </p:cond>
-              </p:prevCondLst>
-              <p:nextCondLst>
-                <p:cond evt="onNext" delay="0">
-                  <p:tgtEl>
-                    <p:sldTgt/>
-                  </p:tgtEl>
-                </p:cond>
-              </p:nextCondLst>
-            </p:seq>
-          </p:childTnLst>
-        </p:cTn>
-      </p:par>
-    </p:tnLst>
-    <p:bldLst>
-      <p:bldP spid="2" grpId="0"/>
-    </p:bldLst>
-  </p:timing>
-</p:sld>
-</file>
-
-<file path=ppt/slides/slide4.xml><?xml version="1.0" encoding="utf-8"?>
-<p:sld xmlns:a="http://schemas.openxmlformats.org/drawingml/2006/main" xmlns:r="http://schemas.openxmlformats.org/officeDocument/2006/relationships" xmlns:p="http://schemas.openxmlformats.org/presentationml/2006/main">
-  <p:cSld>
-    <p:bg>
-      <p:bgPr>
-        <a:solidFill>
-          <a:schemeClr val="bg1">
-            <a:alpha val="78000"/>
-          </a:schemeClr>
-        </a:solidFill>
-        <a:effectLst/>
-      </p:bgPr>
-    </p:bg>
-    <p:spTree>
-      <p:nvGrpSpPr>
-        <p:cNvPr id="1" name=""/>
-        <p:cNvGrpSpPr/>
-        <p:nvPr/>
-      </p:nvGrpSpPr>
-      <p:grpSpPr>
-        <a:xfrm>
-          <a:off x="0" y="0"/>
-          <a:ext cx="0" cy="0"/>
-          <a:chOff x="0" y="0"/>
-          <a:chExt cx="0" cy="0"/>
-        </a:xfrm>
-      </p:grpSpPr>
-      <p:sp>
-        <p:nvSpPr>
-          <p:cNvPr id="2" name="Заголовок 1">
-            <a:extLst>
-              <a:ext uri="{FF2B5EF4-FFF2-40B4-BE49-F238E27FC236}">
-                <a16:creationId xmlns:a16="http://schemas.microsoft.com/office/drawing/2014/main" id="{1F7CFFEC-556E-45D9-9D24-7EF78DD86FD9}"/>
-              </a:ext>
-            </a:extLst>
-          </p:cNvPr>
-          <p:cNvSpPr>
-            <a:spLocks noGrp="1"/>
-          </p:cNvSpPr>
-          <p:nvPr>
-            <p:ph type="title"/>
-          </p:nvPr>
-        </p:nvSpPr>
-        <p:spPr>
-          <a:xfrm>
-            <a:off x="838201" y="207373"/>
-            <a:ext cx="10515600" cy="1325563"/>
-          </a:xfrm>
-        </p:spPr>
-        <p:txBody>
-          <a:bodyPr/>
-          <a:lstStyle/>
-          <a:p>
-            <a:r>
-              <a:rPr lang="ru-RU" dirty="0">
-                <a:solidFill>
-                  <a:schemeClr val="tx1">
-                    <a:lumMod val="85000"/>
-                    <a:lumOff val="15000"/>
-                  </a:schemeClr>
-                </a:solidFill>
-              </a:rPr>
-              <a:t>Обучение и настройки:</a:t>
-            </a:r>
-          </a:p>
-        </p:txBody>
-      </p:sp>
-      <p:sp>
-        <p:nvSpPr>
-          <p:cNvPr id="3" name="Объект 2">
-            <a:extLst>
-              <a:ext uri="{FF2B5EF4-FFF2-40B4-BE49-F238E27FC236}">
-                <a16:creationId xmlns:a16="http://schemas.microsoft.com/office/drawing/2014/main" id="{D5964C29-1AF1-424C-90B7-BBAFA6440403}"/>
-              </a:ext>
-            </a:extLst>
-          </p:cNvPr>
-          <p:cNvSpPr>
-            <a:spLocks noGrp="1"/>
-          </p:cNvSpPr>
-          <p:nvPr>
-            <p:ph idx="1"/>
-          </p:nvPr>
-        </p:nvSpPr>
-        <p:spPr>
-          <a:xfrm>
-            <a:off x="838199" y="1681316"/>
-            <a:ext cx="11157156" cy="4168878"/>
-          </a:xfrm>
-        </p:spPr>
-        <p:txBody>
-          <a:bodyPr>
-            <a:normAutofit/>
-          </a:bodyPr>
-          <a:lstStyle/>
-          <a:p>
-            <a:pPr>
-              <a:buBlip>
-                <a:blip r:embed="rId2">
-                  <a:extLst>
-                    <a:ext uri="{96DAC541-7B7A-43D3-8B79-37D633B846F1}">
-                      <asvg:svgBlip xmlns:asvg="http://schemas.microsoft.com/office/drawing/2016/SVG/main" r:embed="rId3"/>
-                    </a:ext>
-                  </a:extLst>
-                </a:blip>
-              </a:buBlip>
-            </a:pPr>
-            <a:r>
-              <a:rPr lang="ru-RU" dirty="0"/>
-              <a:t>За обучение игрока отвечает класс </a:t>
-            </a:r>
-            <a:r>
-              <a:rPr lang="en-US" dirty="0"/>
-              <a:t>Training</a:t>
-            </a:r>
-            <a:r>
-              <a:rPr lang="ru-RU" dirty="0"/>
-              <a:t>. Это позволяет игроку узнать правила корректности примера и ознакомиться с интерфейсом.</a:t>
-            </a:r>
-          </a:p>
-          <a:p>
-            <a:pPr marL="0" indent="0">
-              <a:buNone/>
-            </a:pPr>
-            <a:endParaRPr lang="ru-RU" dirty="0"/>
-          </a:p>
-          <a:p>
-            <a:pPr>
-              <a:buBlip>
-                <a:blip r:embed="rId4">
-                  <a:extLst>
-                    <a:ext uri="{96DAC541-7B7A-43D3-8B79-37D633B846F1}">
-                      <asvg:svgBlip xmlns:asvg="http://schemas.microsoft.com/office/drawing/2016/SVG/main" r:embed="rId5"/>
-                    </a:ext>
-                  </a:extLst>
-                </a:blip>
-              </a:buBlip>
-            </a:pPr>
-            <a:r>
-              <a:rPr lang="ru-RU" dirty="0"/>
-              <a:t>За настройки отвечает класс </a:t>
-            </a:r>
-            <a:r>
-              <a:rPr lang="en-US" dirty="0"/>
-              <a:t>Settings. </a:t>
-            </a:r>
-            <a:r>
-              <a:rPr lang="ru-RU" dirty="0"/>
-              <a:t>В игре присутствует музыкальное сопровождение, в настройках же есть возможность регулировать его громкость. И, при желании игрока, имеется функция смена курсора.</a:t>
-            </a:r>
-          </a:p>
-          <a:p>
-            <a:pPr marL="0" indent="0">
-              <a:buNone/>
-            </a:pPr>
-            <a:endParaRPr lang="ru-RU" dirty="0"/>
-          </a:p>
-        </p:txBody>
-      </p:sp>
-    </p:spTree>
-    <p:extLst>
-      <p:ext uri="{BB962C8B-B14F-4D97-AF65-F5344CB8AC3E}">
-        <p14:creationId xmlns:p14="http://schemas.microsoft.com/office/powerpoint/2010/main" val="365846375"/>
-      </p:ext>
-    </p:extLst>
-  </p:cSld>
-  <p:clrMapOvr>
-    <a:masterClrMapping/>
-  </p:clrMapOvr>
-  <mc:AlternateContent xmlns:mc="http://schemas.openxmlformats.org/markup-compatibility/2006">
-    <mc:Choice xmlns:p14="http://schemas.microsoft.com/office/powerpoint/2010/main" Requires="p14">
-      <p:transition spd="slow" p14:dur="3400">
-        <p14:reveal/>
-      </p:transition>
-    </mc:Choice>
-    <mc:Fallback>
-      <p:transition spd="slow">
-        <p:fade/>
-      </p:transition>
-    </mc:Fallback>
-  </mc:AlternateContent>
-  <p:timing>
-    <p:tnLst>
-      <p:par>
-        <p:cTn id="1" dur="indefinite" restart="never" nodeType="tmRoot">
-          <p:childTnLst>
-            <p:seq concurrent="1" nextAc="seek">
-              <p:cTn id="2" dur="indefinite" nodeType="mainSeq">
-                <p:childTnLst>
-                  <p:par>
-                    <p:cTn id="3" fill="hold">
-                      <p:stCondLst>
-                        <p:cond delay="indefinite"/>
-                      </p:stCondLst>
-                      <p:childTnLst>
-                        <p:par>
-                          <p:cTn id="4" fill="hold">
-                            <p:stCondLst>
-                              <p:cond delay="0"/>
-                            </p:stCondLst>
-                            <p:childTnLst>
-                              <p:par>
-                                <p:cTn id="5" presetID="10" presetClass="entr" presetSubtype="0" fill="hold" grpId="0" nodeType="clickEffect">
-                                  <p:stCondLst>
-                                    <p:cond delay="0"/>
-                                  </p:stCondLst>
-                                  <p:childTnLst>
-                                    <p:set>
-                                      <p:cBhvr>
-                                        <p:cTn id="6" dur="1" fill="hold">
-                                          <p:stCondLst>
-                                            <p:cond delay="0"/>
-                                          </p:stCondLst>
-                                        </p:cTn>
-                                        <p:tgtEl>
-                                          <p:spTgt spid="2"/>
-                                        </p:tgtEl>
-                                        <p:attrNameLst>
-                                          <p:attrName>style.visibility</p:attrName>
-                                        </p:attrNameLst>
-                                      </p:cBhvr>
-                                      <p:to>
-                                        <p:strVal val="visible"/>
-                                      </p:to>
-                                    </p:set>
-                                    <p:animEffect transition="in" filter="fade">
-                                      <p:cBhvr>
-                                        <p:cTn id="7" dur="500"/>
-                                        <p:tgtEl>
-                                          <p:spTgt spid="2"/>
-                                        </p:tgtEl>
-                                      </p:cBhvr>
-                                    </p:animEffect>
-                                  </p:childTnLst>
-                                </p:cTn>
-                              </p:par>
-                            </p:childTnLst>
-                          </p:cTn>
-                        </p:par>
-                      </p:childTnLst>
-                    </p:cTn>
-                  </p:par>
-                  <p:par>
-                    <p:cTn id="8" fill="hold">
-                      <p:stCondLst>
-                        <p:cond delay="indefinite"/>
-                      </p:stCondLst>
-                      <p:childTnLst>
-                        <p:par>
-                          <p:cTn id="9" fill="hold">
-                            <p:stCondLst>
-                              <p:cond delay="0"/>
-                            </p:stCondLst>
-                            <p:childTnLst>
-                              <p:par>
-                                <p:cTn id="10" presetID="10" presetClass="entr" presetSubtype="0" fill="hold" nodeType="clickEffect">
-                                  <p:stCondLst>
-                                    <p:cond delay="0"/>
-                                  </p:stCondLst>
-                                  <p:childTnLst>
-                                    <p:set>
-                                      <p:cBhvr>
-                                        <p:cTn id="11" dur="1" fill="hold">
-                                          <p:stCondLst>
-                                            <p:cond delay="0"/>
-                                          </p:stCondLst>
-                                        </p:cTn>
-                                        <p:tgtEl>
-                                          <p:spTgt spid="3">
-                                            <p:txEl>
-                                              <p:pRg st="0" end="0"/>
-                                            </p:txEl>
-                                          </p:spTgt>
-                                        </p:tgtEl>
-                                        <p:attrNameLst>
-                                          <p:attrName>style.visibility</p:attrName>
-                                        </p:attrNameLst>
-                                      </p:cBhvr>
-                                      <p:to>
-                                        <p:strVal val="visible"/>
-                                      </p:to>
-                                    </p:set>
-                                    <p:animEffect transition="in" filter="fade">
-                                      <p:cBhvr>
-                                        <p:cTn id="12" dur="500"/>
-                                        <p:tgtEl>
-                                          <p:spTgt spid="3">
-                                            <p:txEl>
-                                              <p:pRg st="0" end="0"/>
                                             </p:txEl>
                                           </p:spTgt>
                                         </p:tgtEl>
@@ -8388,16 +7507,23 @@
         </p:cTn>
       </p:par>
     </p:tnLst>
-    <p:bldLst>
-      <p:bldP spid="2" grpId="0"/>
-    </p:bldLst>
   </p:timing>
 </p:sld>
 </file>
 
-<file path=ppt/slides/slide5.xml><?xml version="1.0" encoding="utf-8"?>
+<file path=ppt/slides/slide3.xml><?xml version="1.0" encoding="utf-8"?>
 <p:sld xmlns:a="http://schemas.openxmlformats.org/drawingml/2006/main" xmlns:r="http://schemas.openxmlformats.org/officeDocument/2006/relationships" xmlns:p="http://schemas.openxmlformats.org/presentationml/2006/main">
   <p:cSld>
+    <p:bg>
+      <p:bgPr>
+        <a:solidFill>
+          <a:schemeClr val="bg1">
+            <a:alpha val="78000"/>
+          </a:schemeClr>
+        </a:solidFill>
+        <a:effectLst/>
+      </p:bgPr>
+    </p:bg>
     <p:spTree>
       <p:nvGrpSpPr>
         <p:cNvPr id="1" name=""/>
@@ -8417,7 +7543,7 @@
           <p:cNvPr id="2" name="Заголовок 1">
             <a:extLst>
               <a:ext uri="{FF2B5EF4-FFF2-40B4-BE49-F238E27FC236}">
-                <a16:creationId xmlns:a16="http://schemas.microsoft.com/office/drawing/2014/main" id="{28987257-33E2-4CCB-B6AF-DA1087223B8C}"/>
+                <a16:creationId xmlns:a16="http://schemas.microsoft.com/office/drawing/2014/main" id="{1F7CFFEC-556E-45D9-9D24-7EF78DD86FD9}"/>
               </a:ext>
             </a:extLst>
           </p:cNvPr>
@@ -8428,14 +7554,26 @@
             <p:ph type="title"/>
           </p:nvPr>
         </p:nvSpPr>
-        <p:spPr/>
+        <p:spPr>
+          <a:xfrm>
+            <a:off x="838201" y="207373"/>
+            <a:ext cx="10515600" cy="1325563"/>
+          </a:xfrm>
+        </p:spPr>
         <p:txBody>
           <a:bodyPr/>
           <a:lstStyle/>
           <a:p>
             <a:r>
-              <a:rPr lang="ru-RU" dirty="0"/>
-              <a:t>Одиночная игра</a:t>
+              <a:rPr lang="ru-RU" dirty="0">
+                <a:solidFill>
+                  <a:schemeClr val="tx1">
+                    <a:lumMod val="85000"/>
+                    <a:lumOff val="15000"/>
+                  </a:schemeClr>
+                </a:solidFill>
+              </a:rPr>
+              <a:t>Реализация:</a:t>
             </a:r>
           </a:p>
         </p:txBody>
@@ -8445,7 +7583,7 @@
           <p:cNvPr id="3" name="Объект 2">
             <a:extLst>
               <a:ext uri="{FF2B5EF4-FFF2-40B4-BE49-F238E27FC236}">
-                <a16:creationId xmlns:a16="http://schemas.microsoft.com/office/drawing/2014/main" id="{49A06D77-F480-4B92-9D10-EC3FBE3C8899}"/>
+                <a16:creationId xmlns:a16="http://schemas.microsoft.com/office/drawing/2014/main" id="{D5964C29-1AF1-424C-90B7-BBAFA6440403}"/>
               </a:ext>
             </a:extLst>
           </p:cNvPr>
@@ -8458,45 +7596,74 @@
         </p:nvSpPr>
         <p:spPr>
           <a:xfrm>
-            <a:off x="838200" y="1504335"/>
-            <a:ext cx="10515600" cy="4463846"/>
+            <a:off x="838199" y="1532936"/>
+            <a:ext cx="10695040" cy="5037701"/>
           </a:xfrm>
         </p:spPr>
         <p:txBody>
-          <a:bodyPr/>
+          <a:bodyPr>
+            <a:normAutofit/>
+          </a:bodyPr>
           <a:lstStyle/>
           <a:p>
             <a:pPr marL="0" indent="0">
               <a:buNone/>
             </a:pPr>
             <a:r>
+              <a:rPr lang="ru-RU" dirty="0">
+                <a:effectLst/>
+                <a:ea typeface="Calibri" panose="020F0502020204030204" pitchFamily="34" charset="0"/>
+              </a:rPr>
+              <a:t>Игра написана на языке программирования </a:t>
+            </a:r>
+            <a:r>
+              <a:rPr lang="en-US" dirty="0">
+                <a:effectLst/>
+                <a:ea typeface="Calibri" panose="020F0502020204030204" pitchFamily="34" charset="0"/>
+              </a:rPr>
+              <a:t>Python </a:t>
+            </a:r>
+            <a:r>
+              <a:rPr lang="ru-RU" dirty="0">
+                <a:effectLst/>
+                <a:ea typeface="Calibri" panose="020F0502020204030204" pitchFamily="34" charset="0"/>
+              </a:rPr>
+              <a:t>с использованием </a:t>
+            </a:r>
+            <a:r>
+              <a:rPr lang="en-US" dirty="0" err="1">
+                <a:effectLst/>
+                <a:ea typeface="Calibri" panose="020F0502020204030204" pitchFamily="34" charset="0"/>
+              </a:rPr>
+              <a:t>pygame</a:t>
+            </a:r>
+            <a:r>
+              <a:rPr lang="en-US" dirty="0">
+                <a:effectLst/>
+                <a:ea typeface="Calibri" panose="020F0502020204030204" pitchFamily="34" charset="0"/>
+              </a:rPr>
+              <a:t> </a:t>
+            </a:r>
+            <a:r>
+              <a:rPr lang="ru-RU" dirty="0">
+                <a:effectLst/>
+                <a:ea typeface="Calibri" panose="020F0502020204030204" pitchFamily="34" charset="0"/>
+              </a:rPr>
+              <a:t>и </a:t>
+            </a:r>
+            <a:r>
+              <a:rPr lang="en-US" dirty="0"/>
+              <a:t>sqlite3.</a:t>
+            </a:r>
+            <a:endParaRPr lang="ru-RU" dirty="0"/>
+          </a:p>
+          <a:p>
+            <a:pPr marL="0" indent="0">
+              <a:buNone/>
+            </a:pPr>
+            <a:r>
               <a:rPr lang="ru-RU" dirty="0"/>
-              <a:t>За одиночную игру отвечает класс </a:t>
-            </a:r>
-            <a:r>
-              <a:rPr lang="en-US" dirty="0"/>
-              <a:t>Story</a:t>
-            </a:r>
-            <a:r>
-              <a:rPr lang="ru-RU" dirty="0"/>
-              <a:t>. Перед началом игры, пользователь имеет возможность погрузиться в историю игры и мира математических дуэлей, для удобства игрока, истории плывущим текстом выводятся на экран. Далее предоставляется выбор трёх глав, но глава закрыта, пока не пройдена предыдущая.</a:t>
-            </a:r>
-          </a:p>
-          <a:p>
-            <a:pPr marL="0" indent="0">
-              <a:buNone/>
-            </a:pPr>
-            <a:r>
-              <a:rPr lang="ru-RU" dirty="0"/>
-              <a:t>В каждой главе своя локация и 3 противника. В переходе между противниками появляется игровая карта для передвижения главного героя до места следующей битвы. За карту отвечает класс </a:t>
-            </a:r>
-            <a:r>
-              <a:rPr lang="en-US" dirty="0"/>
-              <a:t>Map</a:t>
-            </a:r>
-            <a:r>
-              <a:rPr lang="ru-RU" dirty="0"/>
-              <a:t>. У каждого противника есть контрольная сумма, чтобы нанести ему урон, игрок должен набрать большую сумму.</a:t>
+              <a:t>Начальное окно позволяет начать одиночную игру, игру на двух человек, перейти в магазин и настройки, а также пройти обучение.</a:t>
             </a:r>
           </a:p>
         </p:txBody>
@@ -8504,13 +7671,25 @@
     </p:spTree>
     <p:extLst>
       <p:ext uri="{BB962C8B-B14F-4D97-AF65-F5344CB8AC3E}">
-        <p14:creationId xmlns:p14="http://schemas.microsoft.com/office/powerpoint/2010/main" val="1162970444"/>
+        <p14:creationId xmlns:p14="http://schemas.microsoft.com/office/powerpoint/2010/main" val="3629080883"/>
       </p:ext>
     </p:extLst>
   </p:cSld>
   <p:clrMapOvr>
     <a:masterClrMapping/>
   </p:clrMapOvr>
+  <mc:AlternateContent xmlns:mc="http://schemas.openxmlformats.org/markup-compatibility/2006" xmlns:p14="http://schemas.microsoft.com/office/powerpoint/2010/main">
+    <mc:Choice Requires="p14">
+      <p:transition spd="slow" p14:dur="3400">
+        <p14:reveal/>
+      </p:transition>
+    </mc:Choice>
+    <mc:Fallback xmlns="">
+      <p:transition spd="slow">
+        <p:fade/>
+      </p:transition>
+    </mc:Fallback>
+  </mc:AlternateContent>
   <p:timing>
     <p:tnLst>
       <p:par>
@@ -8532,7 +7711,7 @@
                             </p:stCondLst>
                             <p:childTnLst>
                               <p:par>
-                                <p:cTn id="5" presetID="10" presetClass="entr" presetSubtype="0" fill="hold" grpId="0" nodeType="clickEffect">
+                                <p:cTn id="5" presetID="10" presetClass="entr" presetSubtype="0" fill="hold" nodeType="clickEffect">
                                   <p:stCondLst>
                                     <p:cond delay="0"/>
                                   </p:stCondLst>
@@ -8545,7 +7724,11 @@
                                           </p:stCondLst>
                                         </p:cTn>
                                         <p:tgtEl>
-                                          <p:spTgt spid="2"/>
+                                          <p:spTgt spid="3">
+                                            <p:txEl>
+                                              <p:pRg st="0" end="0"/>
+                                            </p:txEl>
+                                          </p:spTgt>
                                         </p:tgtEl>
                                         <p:attrNameLst>
                                           <p:attrName>style.visibility</p:attrName>
@@ -8559,7 +7742,11 @@
                                       <p:cBhvr>
                                         <p:cTn id="7" dur="500"/>
                                         <p:tgtEl>
-                                          <p:spTgt spid="2"/>
+                                          <p:spTgt spid="3">
+                                            <p:txEl>
+                                              <p:pRg st="0" end="0"/>
+                                            </p:txEl>
+                                          </p:spTgt>
                                         </p:tgtEl>
                                       </p:cBhvr>
                                     </p:animEffect>
@@ -8600,7 +7787,7 @@
                                         <p:tgtEl>
                                           <p:spTgt spid="3">
                                             <p:txEl>
-                                              <p:pRg st="0" end="0"/>
+                                              <p:pRg st="1" end="1"/>
                                             </p:txEl>
                                           </p:spTgt>
                                         </p:tgtEl>
@@ -8615,49 +7802,6 @@
                                     <p:animEffect transition="in" filter="fade">
                                       <p:cBhvr>
                                         <p:cTn id="12" dur="500"/>
-                                        <p:tgtEl>
-                                          <p:spTgt spid="3">
-                                            <p:txEl>
-                                              <p:pRg st="0" end="0"/>
-                                            </p:txEl>
-                                          </p:spTgt>
-                                        </p:tgtEl>
-                                      </p:cBhvr>
-                                    </p:animEffect>
-                                  </p:childTnLst>
-                                </p:cTn>
-                              </p:par>
-                              <p:par>
-                                <p:cTn id="13" presetID="10" presetClass="entr" presetSubtype="0" fill="hold" nodeType="withEffect">
-                                  <p:stCondLst>
-                                    <p:cond delay="0"/>
-                                  </p:stCondLst>
-                                  <p:childTnLst>
-                                    <p:set>
-                                      <p:cBhvr>
-                                        <p:cTn id="14" dur="1" fill="hold">
-                                          <p:stCondLst>
-                                            <p:cond delay="0"/>
-                                          </p:stCondLst>
-                                        </p:cTn>
-                                        <p:tgtEl>
-                                          <p:spTgt spid="3">
-                                            <p:txEl>
-                                              <p:pRg st="1" end="1"/>
-                                            </p:txEl>
-                                          </p:spTgt>
-                                        </p:tgtEl>
-                                        <p:attrNameLst>
-                                          <p:attrName>style.visibility</p:attrName>
-                                        </p:attrNameLst>
-                                      </p:cBhvr>
-                                      <p:to>
-                                        <p:strVal val="visible"/>
-                                      </p:to>
-                                    </p:set>
-                                    <p:animEffect transition="in" filter="fade">
-                                      <p:cBhvr>
-                                        <p:cTn id="15" dur="500"/>
                                         <p:tgtEl>
                                           <p:spTgt spid="3">
                                             <p:txEl>
@@ -8697,16 +7841,23 @@
         </p:cTn>
       </p:par>
     </p:tnLst>
-    <p:bldLst>
-      <p:bldP spid="2" grpId="0"/>
-    </p:bldLst>
   </p:timing>
 </p:sld>
 </file>
 
-<file path=ppt/slides/slide6.xml><?xml version="1.0" encoding="utf-8"?>
+<file path=ppt/slides/slide4.xml><?xml version="1.0" encoding="utf-8"?>
 <p:sld xmlns:a="http://schemas.openxmlformats.org/drawingml/2006/main" xmlns:r="http://schemas.openxmlformats.org/officeDocument/2006/relationships" xmlns:p="http://schemas.openxmlformats.org/presentationml/2006/main">
   <p:cSld>
+    <p:bg>
+      <p:bgPr>
+        <a:solidFill>
+          <a:schemeClr val="bg1">
+            <a:alpha val="78000"/>
+          </a:schemeClr>
+        </a:solidFill>
+        <a:effectLst/>
+      </p:bgPr>
+    </p:bg>
     <p:spTree>
       <p:nvGrpSpPr>
         <p:cNvPr id="1" name=""/>
@@ -8726,7 +7877,7 @@
           <p:cNvPr id="2" name="Заголовок 1">
             <a:extLst>
               <a:ext uri="{FF2B5EF4-FFF2-40B4-BE49-F238E27FC236}">
-                <a16:creationId xmlns:a16="http://schemas.microsoft.com/office/drawing/2014/main" id="{3C0CAC71-8213-4DB0-B5E2-6662B0FCD2B2}"/>
+                <a16:creationId xmlns:a16="http://schemas.microsoft.com/office/drawing/2014/main" id="{1F7CFFEC-556E-45D9-9D24-7EF78DD86FD9}"/>
               </a:ext>
             </a:extLst>
           </p:cNvPr>
@@ -8737,14 +7888,26 @@
             <p:ph type="title"/>
           </p:nvPr>
         </p:nvSpPr>
-        <p:spPr/>
+        <p:spPr>
+          <a:xfrm>
+            <a:off x="838201" y="207373"/>
+            <a:ext cx="10515600" cy="1325563"/>
+          </a:xfrm>
+        </p:spPr>
         <p:txBody>
           <a:bodyPr/>
           <a:lstStyle/>
           <a:p>
             <a:r>
-              <a:rPr lang="ru-RU" dirty="0"/>
-              <a:t>Игра на двоих</a:t>
+              <a:rPr lang="ru-RU" dirty="0">
+                <a:solidFill>
+                  <a:schemeClr val="tx1">
+                    <a:lumMod val="85000"/>
+                    <a:lumOff val="15000"/>
+                  </a:schemeClr>
+                </a:solidFill>
+              </a:rPr>
+              <a:t>Обучение и настройки:</a:t>
             </a:r>
           </a:p>
         </p:txBody>
@@ -8754,7 +7917,7 @@
           <p:cNvPr id="3" name="Объект 2">
             <a:extLst>
               <a:ext uri="{FF2B5EF4-FFF2-40B4-BE49-F238E27FC236}">
-                <a16:creationId xmlns:a16="http://schemas.microsoft.com/office/drawing/2014/main" id="{33015D21-504F-4711-A1FE-F248DA95297C}"/>
+                <a16:creationId xmlns:a16="http://schemas.microsoft.com/office/drawing/2014/main" id="{D5964C29-1AF1-424C-90B7-BBAFA6440403}"/>
               </a:ext>
             </a:extLst>
           </p:cNvPr>
@@ -8765,31 +7928,103 @@
             <p:ph idx="1"/>
           </p:nvPr>
         </p:nvSpPr>
-        <p:spPr/>
-        <p:txBody>
-          <a:bodyPr/>
+        <p:spPr>
+          <a:xfrm>
+            <a:off x="838199" y="1681316"/>
+            <a:ext cx="11157156" cy="4168878"/>
+          </a:xfrm>
+        </p:spPr>
+        <p:txBody>
+          <a:bodyPr>
+            <a:normAutofit/>
+          </a:bodyPr>
           <a:lstStyle/>
           <a:p>
+            <a:pPr>
+              <a:buBlip>
+                <a:blip r:embed="rId2">
+                  <a:extLst>
+                    <a:ext uri="{96DAC541-7B7A-43D3-8B79-37D633B846F1}">
+                      <asvg:svgBlip xmlns:asvg="http://schemas.microsoft.com/office/drawing/2016/SVG/main" r:embed="rId3"/>
+                    </a:ext>
+                  </a:extLst>
+                </a:blip>
+              </a:buBlip>
+            </a:pPr>
+            <a:r>
+              <a:rPr lang="ru-RU" dirty="0"/>
+              <a:t>За обучение игрока отвечает класс </a:t>
+            </a:r>
+            <a:r>
+              <a:rPr lang="en-US" dirty="0"/>
+              <a:t>Training</a:t>
+            </a:r>
+            <a:r>
+              <a:rPr lang="ru-RU" dirty="0"/>
+              <a:t>. Это позволяет игроку узнать правила корректности примера и ознакомиться с интерфейсом.</a:t>
+            </a:r>
+          </a:p>
+          <a:p>
             <a:pPr marL="0" indent="0">
               <a:buNone/>
             </a:pPr>
+            <a:endParaRPr lang="ru-RU" dirty="0"/>
+          </a:p>
+          <a:p>
+            <a:pPr>
+              <a:buBlip>
+                <a:blip r:embed="rId4">
+                  <a:extLst>
+                    <a:ext uri="{96DAC541-7B7A-43D3-8B79-37D633B846F1}">
+                      <asvg:svgBlip xmlns:asvg="http://schemas.microsoft.com/office/drawing/2016/SVG/main" r:embed="rId5"/>
+                    </a:ext>
+                  </a:extLst>
+                </a:blip>
+              </a:buBlip>
+            </a:pPr>
             <a:r>
               <a:rPr lang="ru-RU" dirty="0"/>
-              <a:t>К возможностям из одиночной игры, добавляется функция решения примера своего соперника, для сбавления урона, в случае проигрыша. У каждого человека есть 3 попытки на ввод корректного по условиям примера, в ином случае ход переходит сопернику, а контрольная сумму первого игрока становится равно 0. Свой же пример необходимо решить с первого раза.</a:t>
-            </a:r>
+              <a:t>За настройки отвечает класс </a:t>
+            </a:r>
+            <a:r>
+              <a:rPr lang="en-US" dirty="0"/>
+              <a:t>Settings. </a:t>
+            </a:r>
+            <a:r>
+              <a:rPr lang="ru-RU" dirty="0"/>
+              <a:t>В игре присутствует музыкальное сопровождение, в настройках же есть возможность регулировать его громкость. И, при желании игрока, имеется функция смена курсора.</a:t>
+            </a:r>
+          </a:p>
+          <a:p>
+            <a:pPr marL="0" indent="0">
+              <a:buNone/>
+            </a:pPr>
+            <a:endParaRPr lang="ru-RU" dirty="0"/>
           </a:p>
         </p:txBody>
       </p:sp>
     </p:spTree>
     <p:extLst>
       <p:ext uri="{BB962C8B-B14F-4D97-AF65-F5344CB8AC3E}">
-        <p14:creationId xmlns:p14="http://schemas.microsoft.com/office/powerpoint/2010/main" val="3735267773"/>
+        <p14:creationId xmlns:p14="http://schemas.microsoft.com/office/powerpoint/2010/main" val="365846375"/>
       </p:ext>
     </p:extLst>
   </p:cSld>
   <p:clrMapOvr>
     <a:masterClrMapping/>
   </p:clrMapOvr>
+  <mc:AlternateContent xmlns:mc="http://schemas.openxmlformats.org/markup-compatibility/2006" xmlns:p14="http://schemas.microsoft.com/office/powerpoint/2010/main">
+    <mc:Choice Requires="p14">
+      <p:transition spd="slow" p14:dur="3400">
+        <p14:reveal/>
+      </p:transition>
+    </mc:Choice>
+    <mc:Fallback xmlns="">
+      <p:transition spd="slow">
+        <p:fade/>
+      </p:transition>
+    </mc:Fallback>
+  </mc:AlternateContent>
   <p:timing>
     <p:tnLst>
       <p:par>
@@ -8811,7 +8046,7 @@
                             </p:stCondLst>
                             <p:childTnLst>
                               <p:par>
-                                <p:cTn id="5" presetID="10" presetClass="entr" presetSubtype="0" fill="hold" grpId="0" nodeType="clickEffect">
+                                <p:cTn id="5" presetID="10" presetClass="entr" presetSubtype="0" fill="hold" nodeType="clickEffect">
                                   <p:stCondLst>
                                     <p:cond delay="0"/>
                                   </p:stCondLst>
@@ -8824,7 +8059,11 @@
                                           </p:stCondLst>
                                         </p:cTn>
                                         <p:tgtEl>
-                                          <p:spTgt spid="2"/>
+                                          <p:spTgt spid="3">
+                                            <p:txEl>
+                                              <p:pRg st="0" end="0"/>
+                                            </p:txEl>
+                                          </p:spTgt>
                                         </p:tgtEl>
                                         <p:attrNameLst>
                                           <p:attrName>style.visibility</p:attrName>
@@ -8838,7 +8077,11 @@
                                       <p:cBhvr>
                                         <p:cTn id="7" dur="500"/>
                                         <p:tgtEl>
-                                          <p:spTgt spid="2"/>
+                                          <p:spTgt spid="3">
+                                            <p:txEl>
+                                              <p:pRg st="0" end="0"/>
+                                            </p:txEl>
+                                          </p:spTgt>
                                         </p:tgtEl>
                                       </p:cBhvr>
                                     </p:animEffect>
@@ -8879,6 +8122,216 @@
                                         <p:tgtEl>
                                           <p:spTgt spid="3">
                                             <p:txEl>
+                                              <p:pRg st="2" end="2"/>
+                                            </p:txEl>
+                                          </p:spTgt>
+                                        </p:tgtEl>
+                                        <p:attrNameLst>
+                                          <p:attrName>style.visibility</p:attrName>
+                                        </p:attrNameLst>
+                                      </p:cBhvr>
+                                      <p:to>
+                                        <p:strVal val="visible"/>
+                                      </p:to>
+                                    </p:set>
+                                    <p:animEffect transition="in" filter="fade">
+                                      <p:cBhvr>
+                                        <p:cTn id="12" dur="500"/>
+                                        <p:tgtEl>
+                                          <p:spTgt spid="3">
+                                            <p:txEl>
+                                              <p:pRg st="2" end="2"/>
+                                            </p:txEl>
+                                          </p:spTgt>
+                                        </p:tgtEl>
+                                      </p:cBhvr>
+                                    </p:animEffect>
+                                  </p:childTnLst>
+                                </p:cTn>
+                              </p:par>
+                            </p:childTnLst>
+                          </p:cTn>
+                        </p:par>
+                      </p:childTnLst>
+                    </p:cTn>
+                  </p:par>
+                </p:childTnLst>
+              </p:cTn>
+              <p:prevCondLst>
+                <p:cond evt="onPrev" delay="0">
+                  <p:tgtEl>
+                    <p:sldTgt/>
+                  </p:tgtEl>
+                </p:cond>
+              </p:prevCondLst>
+              <p:nextCondLst>
+                <p:cond evt="onNext" delay="0">
+                  <p:tgtEl>
+                    <p:sldTgt/>
+                  </p:tgtEl>
+                </p:cond>
+              </p:nextCondLst>
+            </p:seq>
+          </p:childTnLst>
+        </p:cTn>
+      </p:par>
+    </p:tnLst>
+  </p:timing>
+</p:sld>
+</file>
+
+<file path=ppt/slides/slide5.xml><?xml version="1.0" encoding="utf-8"?>
+<p:sld xmlns:a="http://schemas.openxmlformats.org/drawingml/2006/main" xmlns:r="http://schemas.openxmlformats.org/officeDocument/2006/relationships" xmlns:p="http://schemas.openxmlformats.org/presentationml/2006/main">
+  <p:cSld>
+    <p:spTree>
+      <p:nvGrpSpPr>
+        <p:cNvPr id="1" name=""/>
+        <p:cNvGrpSpPr/>
+        <p:nvPr/>
+      </p:nvGrpSpPr>
+      <p:grpSpPr>
+        <a:xfrm>
+          <a:off x="0" y="0"/>
+          <a:ext cx="0" cy="0"/>
+          <a:chOff x="0" y="0"/>
+          <a:chExt cx="0" cy="0"/>
+        </a:xfrm>
+      </p:grpSpPr>
+      <p:sp>
+        <p:nvSpPr>
+          <p:cNvPr id="2" name="Заголовок 1">
+            <a:extLst>
+              <a:ext uri="{FF2B5EF4-FFF2-40B4-BE49-F238E27FC236}">
+                <a16:creationId xmlns:a16="http://schemas.microsoft.com/office/drawing/2014/main" id="{28987257-33E2-4CCB-B6AF-DA1087223B8C}"/>
+              </a:ext>
+            </a:extLst>
+          </p:cNvPr>
+          <p:cNvSpPr>
+            <a:spLocks noGrp="1"/>
+          </p:cNvSpPr>
+          <p:nvPr>
+            <p:ph type="title"/>
+          </p:nvPr>
+        </p:nvSpPr>
+        <p:spPr/>
+        <p:txBody>
+          <a:bodyPr/>
+          <a:lstStyle/>
+          <a:p>
+            <a:r>
+              <a:rPr lang="ru-RU" dirty="0"/>
+              <a:t>Одиночная игра</a:t>
+            </a:r>
+          </a:p>
+        </p:txBody>
+      </p:sp>
+      <p:sp>
+        <p:nvSpPr>
+          <p:cNvPr id="3" name="Объект 2">
+            <a:extLst>
+              <a:ext uri="{FF2B5EF4-FFF2-40B4-BE49-F238E27FC236}">
+                <a16:creationId xmlns:a16="http://schemas.microsoft.com/office/drawing/2014/main" id="{49A06D77-F480-4B92-9D10-EC3FBE3C8899}"/>
+              </a:ext>
+            </a:extLst>
+          </p:cNvPr>
+          <p:cNvSpPr>
+            <a:spLocks noGrp="1"/>
+          </p:cNvSpPr>
+          <p:nvPr>
+            <p:ph idx="1"/>
+          </p:nvPr>
+        </p:nvSpPr>
+        <p:spPr>
+          <a:xfrm>
+            <a:off x="838200" y="1504335"/>
+            <a:ext cx="10515600" cy="4463846"/>
+          </a:xfrm>
+        </p:spPr>
+        <p:txBody>
+          <a:bodyPr/>
+          <a:lstStyle/>
+          <a:p>
+            <a:pPr marL="0" indent="0">
+              <a:buNone/>
+            </a:pPr>
+            <a:r>
+              <a:rPr lang="ru-RU" dirty="0"/>
+              <a:t>За одиночную игру отвечает класс </a:t>
+            </a:r>
+            <a:r>
+              <a:rPr lang="en-US" dirty="0"/>
+              <a:t>Story</a:t>
+            </a:r>
+            <a:r>
+              <a:rPr lang="ru-RU" dirty="0"/>
+              <a:t>. Перед началом игры, пользователь имеет возможность погрузиться в историю игры и мира математических дуэлей, для удобства игрока, истории плывущим текстом выводятся на экран. Далее предоставляется выбор трёх глав, но глава закрыта, пока не пройдена предыдущая.</a:t>
+            </a:r>
+          </a:p>
+          <a:p>
+            <a:pPr marL="0" indent="0">
+              <a:buNone/>
+            </a:pPr>
+            <a:r>
+              <a:rPr lang="ru-RU" dirty="0"/>
+              <a:t>В каждой главе своя локация и 3 противника. В переходе между противниками появляется игровая карта для передвижения главного героя до места следующей битвы. За карту отвечает класс </a:t>
+            </a:r>
+            <a:r>
+              <a:rPr lang="en-US" dirty="0"/>
+              <a:t>Map</a:t>
+            </a:r>
+            <a:r>
+              <a:rPr lang="ru-RU" dirty="0"/>
+              <a:t>. У каждого противника есть контрольная сумма, чтобы нанести ему урон, игрок должен набрать большую сумму.</a:t>
+            </a:r>
+          </a:p>
+        </p:txBody>
+      </p:sp>
+    </p:spTree>
+    <p:extLst>
+      <p:ext uri="{BB962C8B-B14F-4D97-AF65-F5344CB8AC3E}">
+        <p14:creationId xmlns:p14="http://schemas.microsoft.com/office/powerpoint/2010/main" val="1162970444"/>
+      </p:ext>
+    </p:extLst>
+  </p:cSld>
+  <p:clrMapOvr>
+    <a:masterClrMapping/>
+  </p:clrMapOvr>
+  <p:timing>
+    <p:tnLst>
+      <p:par>
+        <p:cTn id="1" dur="indefinite" restart="never" nodeType="tmRoot">
+          <p:childTnLst>
+            <p:seq concurrent="1" nextAc="seek">
+              <p:cTn id="2" dur="indefinite" nodeType="mainSeq">
+                <p:childTnLst>
+                  <p:par>
+                    <p:cTn id="3" fill="hold">
+                      <p:stCondLst>
+                        <p:cond delay="indefinite"/>
+                      </p:stCondLst>
+                      <p:childTnLst>
+                        <p:par>
+                          <p:cTn id="4" fill="hold">
+                            <p:stCondLst>
+                              <p:cond delay="0"/>
+                            </p:stCondLst>
+                            <p:childTnLst>
+                              <p:par>
+                                <p:cTn id="5" presetID="10" presetClass="entr" presetSubtype="0" fill="hold" nodeType="clickEffect">
+                                  <p:stCondLst>
+                                    <p:cond delay="0"/>
+                                  </p:stCondLst>
+                                  <p:childTnLst>
+                                    <p:set>
+                                      <p:cBhvr>
+                                        <p:cTn id="6" dur="1" fill="hold">
+                                          <p:stCondLst>
+                                            <p:cond delay="0"/>
+                                          </p:stCondLst>
+                                        </p:cTn>
+                                        <p:tgtEl>
+                                          <p:spTgt spid="3">
+                                            <p:txEl>
                                               <p:pRg st="0" end="0"/>
                                             </p:txEl>
                                           </p:spTgt>
@@ -8893,7 +8346,230 @@
                                     </p:set>
                                     <p:animEffect transition="in" filter="fade">
                                       <p:cBhvr>
-                                        <p:cTn id="12" dur="500"/>
+                                        <p:cTn id="7" dur="500"/>
+                                        <p:tgtEl>
+                                          <p:spTgt spid="3">
+                                            <p:txEl>
+                                              <p:pRg st="0" end="0"/>
+                                            </p:txEl>
+                                          </p:spTgt>
+                                        </p:tgtEl>
+                                      </p:cBhvr>
+                                    </p:animEffect>
+                                  </p:childTnLst>
+                                </p:cTn>
+                              </p:par>
+                              <p:par>
+                                <p:cTn id="8" presetID="10" presetClass="entr" presetSubtype="0" fill="hold" nodeType="withEffect">
+                                  <p:stCondLst>
+                                    <p:cond delay="0"/>
+                                  </p:stCondLst>
+                                  <p:childTnLst>
+                                    <p:set>
+                                      <p:cBhvr>
+                                        <p:cTn id="9" dur="1" fill="hold">
+                                          <p:stCondLst>
+                                            <p:cond delay="0"/>
+                                          </p:stCondLst>
+                                        </p:cTn>
+                                        <p:tgtEl>
+                                          <p:spTgt spid="3">
+                                            <p:txEl>
+                                              <p:pRg st="1" end="1"/>
+                                            </p:txEl>
+                                          </p:spTgt>
+                                        </p:tgtEl>
+                                        <p:attrNameLst>
+                                          <p:attrName>style.visibility</p:attrName>
+                                        </p:attrNameLst>
+                                      </p:cBhvr>
+                                      <p:to>
+                                        <p:strVal val="visible"/>
+                                      </p:to>
+                                    </p:set>
+                                    <p:animEffect transition="in" filter="fade">
+                                      <p:cBhvr>
+                                        <p:cTn id="10" dur="500"/>
+                                        <p:tgtEl>
+                                          <p:spTgt spid="3">
+                                            <p:txEl>
+                                              <p:pRg st="1" end="1"/>
+                                            </p:txEl>
+                                          </p:spTgt>
+                                        </p:tgtEl>
+                                      </p:cBhvr>
+                                    </p:animEffect>
+                                  </p:childTnLst>
+                                </p:cTn>
+                              </p:par>
+                            </p:childTnLst>
+                          </p:cTn>
+                        </p:par>
+                      </p:childTnLst>
+                    </p:cTn>
+                  </p:par>
+                </p:childTnLst>
+              </p:cTn>
+              <p:prevCondLst>
+                <p:cond evt="onPrev" delay="0">
+                  <p:tgtEl>
+                    <p:sldTgt/>
+                  </p:tgtEl>
+                </p:cond>
+              </p:prevCondLst>
+              <p:nextCondLst>
+                <p:cond evt="onNext" delay="0">
+                  <p:tgtEl>
+                    <p:sldTgt/>
+                  </p:tgtEl>
+                </p:cond>
+              </p:nextCondLst>
+            </p:seq>
+          </p:childTnLst>
+        </p:cTn>
+      </p:par>
+    </p:tnLst>
+  </p:timing>
+</p:sld>
+</file>
+
+<file path=ppt/slides/slide6.xml><?xml version="1.0" encoding="utf-8"?>
+<p:sld xmlns:a="http://schemas.openxmlformats.org/drawingml/2006/main" xmlns:r="http://schemas.openxmlformats.org/officeDocument/2006/relationships" xmlns:p="http://schemas.openxmlformats.org/presentationml/2006/main">
+  <p:cSld>
+    <p:spTree>
+      <p:nvGrpSpPr>
+        <p:cNvPr id="1" name=""/>
+        <p:cNvGrpSpPr/>
+        <p:nvPr/>
+      </p:nvGrpSpPr>
+      <p:grpSpPr>
+        <a:xfrm>
+          <a:off x="0" y="0"/>
+          <a:ext cx="0" cy="0"/>
+          <a:chOff x="0" y="0"/>
+          <a:chExt cx="0" cy="0"/>
+        </a:xfrm>
+      </p:grpSpPr>
+      <p:sp>
+        <p:nvSpPr>
+          <p:cNvPr id="2" name="Заголовок 1">
+            <a:extLst>
+              <a:ext uri="{FF2B5EF4-FFF2-40B4-BE49-F238E27FC236}">
+                <a16:creationId xmlns:a16="http://schemas.microsoft.com/office/drawing/2014/main" id="{3C0CAC71-8213-4DB0-B5E2-6662B0FCD2B2}"/>
+              </a:ext>
+            </a:extLst>
+          </p:cNvPr>
+          <p:cNvSpPr>
+            <a:spLocks noGrp="1"/>
+          </p:cNvSpPr>
+          <p:nvPr>
+            <p:ph type="title"/>
+          </p:nvPr>
+        </p:nvSpPr>
+        <p:spPr/>
+        <p:txBody>
+          <a:bodyPr/>
+          <a:lstStyle/>
+          <a:p>
+            <a:r>
+              <a:rPr lang="ru-RU" dirty="0"/>
+              <a:t>Игра на двоих</a:t>
+            </a:r>
+          </a:p>
+        </p:txBody>
+      </p:sp>
+      <p:sp>
+        <p:nvSpPr>
+          <p:cNvPr id="3" name="Объект 2">
+            <a:extLst>
+              <a:ext uri="{FF2B5EF4-FFF2-40B4-BE49-F238E27FC236}">
+                <a16:creationId xmlns:a16="http://schemas.microsoft.com/office/drawing/2014/main" id="{33015D21-504F-4711-A1FE-F248DA95297C}"/>
+              </a:ext>
+            </a:extLst>
+          </p:cNvPr>
+          <p:cNvSpPr>
+            <a:spLocks noGrp="1"/>
+          </p:cNvSpPr>
+          <p:nvPr>
+            <p:ph idx="1"/>
+          </p:nvPr>
+        </p:nvSpPr>
+        <p:spPr/>
+        <p:txBody>
+          <a:bodyPr/>
+          <a:lstStyle/>
+          <a:p>
+            <a:pPr marL="0" indent="0">
+              <a:buNone/>
+            </a:pPr>
+            <a:r>
+              <a:rPr lang="ru-RU" dirty="0"/>
+              <a:t>К возможностям из одиночной игры, добавляется функция решения примера своего соперника, для сбавления урона, в случае проигрыша. У каждого человека есть 3 попытки на ввод корректного по условиям примера, в ином случае ход переходит сопернику, а контрольная сумму первого игрока становится равно 0. Свой же пример необходимо решить с первого раза.</a:t>
+            </a:r>
+          </a:p>
+        </p:txBody>
+      </p:sp>
+    </p:spTree>
+    <p:extLst>
+      <p:ext uri="{BB962C8B-B14F-4D97-AF65-F5344CB8AC3E}">
+        <p14:creationId xmlns:p14="http://schemas.microsoft.com/office/powerpoint/2010/main" val="3735267773"/>
+      </p:ext>
+    </p:extLst>
+  </p:cSld>
+  <p:clrMapOvr>
+    <a:masterClrMapping/>
+  </p:clrMapOvr>
+  <p:timing>
+    <p:tnLst>
+      <p:par>
+        <p:cTn id="1" dur="indefinite" restart="never" nodeType="tmRoot">
+          <p:childTnLst>
+            <p:seq concurrent="1" nextAc="seek">
+              <p:cTn id="2" dur="indefinite" nodeType="mainSeq">
+                <p:childTnLst>
+                  <p:par>
+                    <p:cTn id="3" fill="hold">
+                      <p:stCondLst>
+                        <p:cond delay="indefinite"/>
+                      </p:stCondLst>
+                      <p:childTnLst>
+                        <p:par>
+                          <p:cTn id="4" fill="hold">
+                            <p:stCondLst>
+                              <p:cond delay="0"/>
+                            </p:stCondLst>
+                            <p:childTnLst>
+                              <p:par>
+                                <p:cTn id="5" presetID="10" presetClass="entr" presetSubtype="0" fill="hold" nodeType="clickEffect">
+                                  <p:stCondLst>
+                                    <p:cond delay="0"/>
+                                  </p:stCondLst>
+                                  <p:childTnLst>
+                                    <p:set>
+                                      <p:cBhvr>
+                                        <p:cTn id="6" dur="1" fill="hold">
+                                          <p:stCondLst>
+                                            <p:cond delay="0"/>
+                                          </p:stCondLst>
+                                        </p:cTn>
+                                        <p:tgtEl>
+                                          <p:spTgt spid="3">
+                                            <p:txEl>
+                                              <p:pRg st="0" end="0"/>
+                                            </p:txEl>
+                                          </p:spTgt>
+                                        </p:tgtEl>
+                                        <p:attrNameLst>
+                                          <p:attrName>style.visibility</p:attrName>
+                                        </p:attrNameLst>
+                                      </p:cBhvr>
+                                      <p:to>
+                                        <p:strVal val="visible"/>
+                                      </p:to>
+                                    </p:set>
+                                    <p:animEffect transition="in" filter="fade">
+                                      <p:cBhvr>
+                                        <p:cTn id="7" dur="500"/>
                                         <p:tgtEl>
                                           <p:spTgt spid="3">
                                             <p:txEl>
@@ -8933,9 +8609,6 @@
         </p:cTn>
       </p:par>
     </p:tnLst>
-    <p:bldLst>
-      <p:bldP spid="2" grpId="0"/>
-    </p:bldLst>
   </p:timing>
 </p:sld>
 </file>
@@ -9078,7 +8751,7 @@
                             </p:stCondLst>
                             <p:childTnLst>
                               <p:par>
-                                <p:cTn id="5" presetID="10" presetClass="entr" presetSubtype="0" fill="hold" grpId="0" nodeType="clickEffect">
+                                <p:cTn id="5" presetID="10" presetClass="entr" presetSubtype="0" fill="hold" nodeType="clickEffect">
                                   <p:stCondLst>
                                     <p:cond delay="0"/>
                                   </p:stCondLst>
@@ -9086,59 +8759,6 @@
                                     <p:set>
                                       <p:cBhvr>
                                         <p:cTn id="6" dur="1" fill="hold">
-                                          <p:stCondLst>
-                                            <p:cond delay="0"/>
-                                          </p:stCondLst>
-                                        </p:cTn>
-                                        <p:tgtEl>
-                                          <p:spTgt spid="2"/>
-                                        </p:tgtEl>
-                                        <p:attrNameLst>
-                                          <p:attrName>style.visibility</p:attrName>
-                                        </p:attrNameLst>
-                                      </p:cBhvr>
-                                      <p:to>
-                                        <p:strVal val="visible"/>
-                                      </p:to>
-                                    </p:set>
-                                    <p:animEffect transition="in" filter="fade">
-                                      <p:cBhvr>
-                                        <p:cTn id="7" dur="500"/>
-                                        <p:tgtEl>
-                                          <p:spTgt spid="2"/>
-                                        </p:tgtEl>
-                                      </p:cBhvr>
-                                    </p:animEffect>
-                                  </p:childTnLst>
-                                </p:cTn>
-                              </p:par>
-                            </p:childTnLst>
-                          </p:cTn>
-                        </p:par>
-                      </p:childTnLst>
-                    </p:cTn>
-                  </p:par>
-                  <p:par>
-                    <p:cTn id="8" fill="hold">
-                      <p:stCondLst>
-                        <p:cond delay="indefinite"/>
-                      </p:stCondLst>
-                      <p:childTnLst>
-                        <p:par>
-                          <p:cTn id="9" fill="hold">
-                            <p:stCondLst>
-                              <p:cond delay="0"/>
-                            </p:stCondLst>
-                            <p:childTnLst>
-                              <p:par>
-                                <p:cTn id="10" presetID="10" presetClass="entr" presetSubtype="0" fill="hold" nodeType="clickEffect">
-                                  <p:stCondLst>
-                                    <p:cond delay="0"/>
-                                  </p:stCondLst>
-                                  <p:childTnLst>
-                                    <p:set>
-                                      <p:cBhvr>
-                                        <p:cTn id="11" dur="1" fill="hold">
                                           <p:stCondLst>
                                             <p:cond delay="0"/>
                                           </p:stCondLst>
@@ -9160,7 +8780,7 @@
                                     </p:set>
                                     <p:animEffect transition="in" filter="fade">
                                       <p:cBhvr>
-                                        <p:cTn id="12" dur="500"/>
+                                        <p:cTn id="7" dur="500"/>
                                         <p:tgtEl>
                                           <p:spTgt spid="3">
                                             <p:txEl>
@@ -9174,14 +8794,14 @@
                                 </p:cTn>
                               </p:par>
                               <p:par>
-                                <p:cTn id="13" presetID="10" presetClass="entr" presetSubtype="0" fill="hold" nodeType="withEffect">
+                                <p:cTn id="8" presetID="10" presetClass="entr" presetSubtype="0" fill="hold" nodeType="withEffect">
                                   <p:stCondLst>
                                     <p:cond delay="0"/>
                                   </p:stCondLst>
                                   <p:childTnLst>
                                     <p:set>
                                       <p:cBhvr>
-                                        <p:cTn id="14" dur="1" fill="hold">
+                                        <p:cTn id="9" dur="1" fill="hold">
                                           <p:stCondLst>
                                             <p:cond delay="0"/>
                                           </p:stCondLst>
@@ -9203,7 +8823,7 @@
                                     </p:set>
                                     <p:animEffect transition="in" filter="fade">
                                       <p:cBhvr>
-                                        <p:cTn id="15" dur="500"/>
+                                        <p:cTn id="10" dur="500"/>
                                         <p:tgtEl>
                                           <p:spTgt spid="3">
                                             <p:txEl>
@@ -9217,14 +8837,14 @@
                                 </p:cTn>
                               </p:par>
                               <p:par>
-                                <p:cTn id="16" presetID="10" presetClass="entr" presetSubtype="0" fill="hold" nodeType="withEffect">
+                                <p:cTn id="11" presetID="10" presetClass="entr" presetSubtype="0" fill="hold" nodeType="withEffect">
                                   <p:stCondLst>
                                     <p:cond delay="0"/>
                                   </p:stCondLst>
                                   <p:childTnLst>
                                     <p:set>
                                       <p:cBhvr>
-                                        <p:cTn id="17" dur="1" fill="hold">
+                                        <p:cTn id="12" dur="1" fill="hold">
                                           <p:stCondLst>
                                             <p:cond delay="0"/>
                                           </p:stCondLst>
@@ -9246,7 +8866,7 @@
                                     </p:set>
                                     <p:animEffect transition="in" filter="fade">
                                       <p:cBhvr>
-                                        <p:cTn id="18" dur="500"/>
+                                        <p:cTn id="13" dur="500"/>
                                         <p:tgtEl>
                                           <p:spTgt spid="3">
                                             <p:txEl>
@@ -9286,9 +8906,6 @@
         </p:cTn>
       </p:par>
     </p:tnLst>
-    <p:bldLst>
-      <p:bldP spid="2" grpId="0"/>
-    </p:bldLst>
   </p:timing>
 </p:sld>
 </file>
@@ -9429,7 +9046,7 @@
                             </p:stCondLst>
                             <p:childTnLst>
                               <p:par>
-                                <p:cTn id="5" presetID="10" presetClass="entr" presetSubtype="0" fill="hold" grpId="0" nodeType="clickEffect">
+                                <p:cTn id="5" presetID="10" presetClass="entr" presetSubtype="0" fill="hold" nodeType="clickEffect">
                                   <p:stCondLst>
                                     <p:cond delay="0"/>
                                   </p:stCondLst>
@@ -9437,59 +9054,6 @@
                                     <p:set>
                                       <p:cBhvr>
                                         <p:cTn id="6" dur="1" fill="hold">
-                                          <p:stCondLst>
-                                            <p:cond delay="0"/>
-                                          </p:stCondLst>
-                                        </p:cTn>
-                                        <p:tgtEl>
-                                          <p:spTgt spid="2"/>
-                                        </p:tgtEl>
-                                        <p:attrNameLst>
-                                          <p:attrName>style.visibility</p:attrName>
-                                        </p:attrNameLst>
-                                      </p:cBhvr>
-                                      <p:to>
-                                        <p:strVal val="visible"/>
-                                      </p:to>
-                                    </p:set>
-                                    <p:animEffect transition="in" filter="fade">
-                                      <p:cBhvr>
-                                        <p:cTn id="7" dur="500"/>
-                                        <p:tgtEl>
-                                          <p:spTgt spid="2"/>
-                                        </p:tgtEl>
-                                      </p:cBhvr>
-                                    </p:animEffect>
-                                  </p:childTnLst>
-                                </p:cTn>
-                              </p:par>
-                            </p:childTnLst>
-                          </p:cTn>
-                        </p:par>
-                      </p:childTnLst>
-                    </p:cTn>
-                  </p:par>
-                  <p:par>
-                    <p:cTn id="8" fill="hold">
-                      <p:stCondLst>
-                        <p:cond delay="indefinite"/>
-                      </p:stCondLst>
-                      <p:childTnLst>
-                        <p:par>
-                          <p:cTn id="9" fill="hold">
-                            <p:stCondLst>
-                              <p:cond delay="0"/>
-                            </p:stCondLst>
-                            <p:childTnLst>
-                              <p:par>
-                                <p:cTn id="10" presetID="10" presetClass="entr" presetSubtype="0" fill="hold" nodeType="clickEffect">
-                                  <p:stCondLst>
-                                    <p:cond delay="0"/>
-                                  </p:stCondLst>
-                                  <p:childTnLst>
-                                    <p:set>
-                                      <p:cBhvr>
-                                        <p:cTn id="11" dur="1" fill="hold">
                                           <p:stCondLst>
                                             <p:cond delay="0"/>
                                           </p:stCondLst>
@@ -9511,7 +9075,7 @@
                                     </p:set>
                                     <p:animEffect transition="in" filter="fade">
                                       <p:cBhvr>
-                                        <p:cTn id="12" dur="500"/>
+                                        <p:cTn id="7" dur="500"/>
                                         <p:tgtEl>
                                           <p:spTgt spid="3">
                                             <p:txEl>
@@ -9525,14 +9089,14 @@
                                 </p:cTn>
                               </p:par>
                               <p:par>
-                                <p:cTn id="13" presetID="10" presetClass="entr" presetSubtype="0" fill="hold" nodeType="withEffect">
+                                <p:cTn id="8" presetID="10" presetClass="entr" presetSubtype="0" fill="hold" nodeType="withEffect">
                                   <p:stCondLst>
                                     <p:cond delay="0"/>
                                   </p:stCondLst>
                                   <p:childTnLst>
                                     <p:set>
                                       <p:cBhvr>
-                                        <p:cTn id="14" dur="1" fill="hold">
+                                        <p:cTn id="9" dur="1" fill="hold">
                                           <p:stCondLst>
                                             <p:cond delay="0"/>
                                           </p:stCondLst>
@@ -9554,7 +9118,7 @@
                                     </p:set>
                                     <p:animEffect transition="in" filter="fade">
                                       <p:cBhvr>
-                                        <p:cTn id="15" dur="500"/>
+                                        <p:cTn id="10" dur="500"/>
                                         <p:tgtEl>
                                           <p:spTgt spid="3">
                                             <p:txEl>
@@ -9568,14 +9132,14 @@
                                 </p:cTn>
                               </p:par>
                               <p:par>
-                                <p:cTn id="16" presetID="10" presetClass="entr" presetSubtype="0" fill="hold" nodeType="withEffect">
+                                <p:cTn id="11" presetID="10" presetClass="entr" presetSubtype="0" fill="hold" nodeType="withEffect">
                                   <p:stCondLst>
                                     <p:cond delay="0"/>
                                   </p:stCondLst>
                                   <p:childTnLst>
                                     <p:set>
                                       <p:cBhvr>
-                                        <p:cTn id="17" dur="1" fill="hold">
+                                        <p:cTn id="12" dur="1" fill="hold">
                                           <p:stCondLst>
                                             <p:cond delay="0"/>
                                           </p:stCondLst>
@@ -9597,7 +9161,7 @@
                                     </p:set>
                                     <p:animEffect transition="in" filter="fade">
                                       <p:cBhvr>
-                                        <p:cTn id="18" dur="500"/>
+                                        <p:cTn id="13" dur="500"/>
                                         <p:tgtEl>
                                           <p:spTgt spid="3">
                                             <p:txEl>
@@ -9637,9 +9201,6 @@
         </p:cTn>
       </p:par>
     </p:tnLst>
-    <p:bldLst>
-      <p:bldP spid="2" grpId="0"/>
-    </p:bldLst>
   </p:timing>
 </p:sld>
 </file>
@@ -9710,7 +9271,37 @@
           <a:bodyPr/>
           <a:lstStyle/>
           <a:p>
-            <a:endParaRPr lang="ru-RU"/>
+            <a:r>
+              <a:rPr lang="ru-RU" b="0" i="0" dirty="0">
+                <a:effectLst/>
+              </a:rPr>
+              <a:t>Несмотря на всю законченность проекта, у нас есть идеи для его доработки, например можно добавить глобальную систему рейтинга всех игроков, когда-либо зарегистрировавшихся в игре, отсюда плавно вытекает система авторизации пользователей. Существует так же концепция DLC для нашей игры – </a:t>
+            </a:r>
+            <a:r>
+              <a:rPr lang="ru-RU" b="0" i="0" dirty="0" err="1">
+                <a:effectLst/>
+              </a:rPr>
+              <a:t>Geometric</a:t>
+            </a:r>
+            <a:r>
+              <a:rPr lang="ru-RU" b="0" i="0" dirty="0">
+                <a:effectLst/>
+              </a:rPr>
+              <a:t> </a:t>
+            </a:r>
+            <a:r>
+              <a:rPr lang="ru-RU" b="0" i="0" dirty="0" err="1">
+                <a:effectLst/>
+              </a:rPr>
+              <a:t>Invasion</a:t>
+            </a:r>
+            <a:r>
+              <a:rPr lang="ru-RU" b="0" i="0" dirty="0">
+                <a:effectLst/>
+              </a:rPr>
+              <a:t>(Геометрическое вторжение), в котором будут введены новые механики оборонительных заклинаний, проверяющих уже знания не только алгебры, но и геометрии, продолжение сюжетной линии прилагается.</a:t>
+            </a:r>
+            <a:endParaRPr lang="ru-RU" dirty="0"/>
           </a:p>
         </p:txBody>
       </p:sp>
@@ -9745,7 +9336,7 @@
                             </p:stCondLst>
                             <p:childTnLst>
                               <p:par>
-                                <p:cTn id="5" presetID="10" presetClass="entr" presetSubtype="0" fill="hold" grpId="0" nodeType="clickEffect">
+                                <p:cTn id="5" presetID="10" presetClass="entr" presetSubtype="0" fill="hold" nodeType="clickEffect">
                                   <p:stCondLst>
                                     <p:cond delay="0"/>
                                   </p:stCondLst>
@@ -9758,7 +9349,11 @@
                                           </p:stCondLst>
                                         </p:cTn>
                                         <p:tgtEl>
-                                          <p:spTgt spid="2"/>
+                                          <p:spTgt spid="3">
+                                            <p:txEl>
+                                              <p:pRg st="0" end="0"/>
+                                            </p:txEl>
+                                          </p:spTgt>
                                         </p:tgtEl>
                                         <p:attrNameLst>
                                           <p:attrName>style.visibility</p:attrName>
@@ -9772,7 +9367,11 @@
                                       <p:cBhvr>
                                         <p:cTn id="7" dur="500"/>
                                         <p:tgtEl>
-                                          <p:spTgt spid="2"/>
+                                          <p:spTgt spid="3">
+                                            <p:txEl>
+                                              <p:pRg st="0" end="0"/>
+                                            </p:txEl>
+                                          </p:spTgt>
                                         </p:tgtEl>
                                       </p:cBhvr>
                                     </p:animEffect>
@@ -9806,9 +9405,6 @@
         </p:cTn>
       </p:par>
     </p:tnLst>
-    <p:bldLst>
-      <p:bldP spid="2" grpId="0"/>
-    </p:bldLst>
   </p:timing>
 </p:sld>
 </file>

</xml_diff>